<commit_message>
edita etapa extract e nome do arquivo csv
</commit_message>
<xml_diff>
--- a/static/etl-age7.pptx
+++ b/static/etl-age7.pptx
@@ -197,7 +197,7 @@
           <a:p>
             <a:fld id="{CC7EC80D-E571-4302-BB96-8067BAB1B7C7}" type="datetimeFigureOut">
               <a:rPr lang="pt-BR" smtClean="0"/>
-              <a:t>01/02/2022</a:t>
+              <a:t>13/06/2022</a:t>
             </a:fld>
             <a:endParaRPr lang="pt-BR"/>
           </a:p>
@@ -935,7 +935,7 @@
           <a:p>
             <a:fld id="{DCC23839-6F31-4D56-BCDD-223984C97EC5}" type="datetimeFigureOut">
               <a:rPr lang="pt-BR" smtClean="0"/>
-              <a:t>01/02/2022</a:t>
+              <a:t>13/06/2022</a:t>
             </a:fld>
             <a:endParaRPr lang="pt-BR"/>
           </a:p>
@@ -1105,7 +1105,7 @@
           <a:p>
             <a:fld id="{DCC23839-6F31-4D56-BCDD-223984C97EC5}" type="datetimeFigureOut">
               <a:rPr lang="pt-BR" smtClean="0"/>
-              <a:t>01/02/2022</a:t>
+              <a:t>13/06/2022</a:t>
             </a:fld>
             <a:endParaRPr lang="pt-BR"/>
           </a:p>
@@ -1285,7 +1285,7 @@
           <a:p>
             <a:fld id="{DCC23839-6F31-4D56-BCDD-223984C97EC5}" type="datetimeFigureOut">
               <a:rPr lang="pt-BR" smtClean="0"/>
-              <a:t>01/02/2022</a:t>
+              <a:t>13/06/2022</a:t>
             </a:fld>
             <a:endParaRPr lang="pt-BR"/>
           </a:p>
@@ -1455,7 +1455,7 @@
           <a:p>
             <a:fld id="{DCC23839-6F31-4D56-BCDD-223984C97EC5}" type="datetimeFigureOut">
               <a:rPr lang="pt-BR" smtClean="0"/>
-              <a:t>01/02/2022</a:t>
+              <a:t>13/06/2022</a:t>
             </a:fld>
             <a:endParaRPr lang="pt-BR"/>
           </a:p>
@@ -1701,7 +1701,7 @@
           <a:p>
             <a:fld id="{DCC23839-6F31-4D56-BCDD-223984C97EC5}" type="datetimeFigureOut">
               <a:rPr lang="pt-BR" smtClean="0"/>
-              <a:t>01/02/2022</a:t>
+              <a:t>13/06/2022</a:t>
             </a:fld>
             <a:endParaRPr lang="pt-BR"/>
           </a:p>
@@ -1933,7 +1933,7 @@
           <a:p>
             <a:fld id="{DCC23839-6F31-4D56-BCDD-223984C97EC5}" type="datetimeFigureOut">
               <a:rPr lang="pt-BR" smtClean="0"/>
-              <a:t>01/02/2022</a:t>
+              <a:t>13/06/2022</a:t>
             </a:fld>
             <a:endParaRPr lang="pt-BR"/>
           </a:p>
@@ -2300,7 +2300,7 @@
           <a:p>
             <a:fld id="{DCC23839-6F31-4D56-BCDD-223984C97EC5}" type="datetimeFigureOut">
               <a:rPr lang="pt-BR" smtClean="0"/>
-              <a:t>01/02/2022</a:t>
+              <a:t>13/06/2022</a:t>
             </a:fld>
             <a:endParaRPr lang="pt-BR"/>
           </a:p>
@@ -2418,7 +2418,7 @@
           <a:p>
             <a:fld id="{DCC23839-6F31-4D56-BCDD-223984C97EC5}" type="datetimeFigureOut">
               <a:rPr lang="pt-BR" smtClean="0"/>
-              <a:t>01/02/2022</a:t>
+              <a:t>13/06/2022</a:t>
             </a:fld>
             <a:endParaRPr lang="pt-BR"/>
           </a:p>
@@ -2513,7 +2513,7 @@
           <a:p>
             <a:fld id="{DCC23839-6F31-4D56-BCDD-223984C97EC5}" type="datetimeFigureOut">
               <a:rPr lang="pt-BR" smtClean="0"/>
-              <a:t>01/02/2022</a:t>
+              <a:t>13/06/2022</a:t>
             </a:fld>
             <a:endParaRPr lang="pt-BR"/>
           </a:p>
@@ -2790,7 +2790,7 @@
           <a:p>
             <a:fld id="{DCC23839-6F31-4D56-BCDD-223984C97EC5}" type="datetimeFigureOut">
               <a:rPr lang="pt-BR" smtClean="0"/>
-              <a:t>01/02/2022</a:t>
+              <a:t>13/06/2022</a:t>
             </a:fld>
             <a:endParaRPr lang="pt-BR"/>
           </a:p>
@@ -3043,7 +3043,7 @@
           <a:p>
             <a:fld id="{DCC23839-6F31-4D56-BCDD-223984C97EC5}" type="datetimeFigureOut">
               <a:rPr lang="pt-BR" smtClean="0"/>
-              <a:t>01/02/2022</a:t>
+              <a:t>13/06/2022</a:t>
             </a:fld>
             <a:endParaRPr lang="pt-BR"/>
           </a:p>
@@ -3256,7 +3256,7 @@
           <a:p>
             <a:fld id="{DCC23839-6F31-4D56-BCDD-223984C97EC5}" type="datetimeFigureOut">
               <a:rPr lang="pt-BR" smtClean="0"/>
-              <a:t>01/02/2022</a:t>
+              <a:t>13/06/2022</a:t>
             </a:fld>
             <a:endParaRPr lang="pt-BR"/>
           </a:p>
@@ -3928,53 +3928,6 @@
       </p:sp>
       <p:sp>
         <p:nvSpPr>
-          <p:cNvPr id="8" name="Fluxograma: Decisão 7"/>
-          <p:cNvSpPr/>
-          <p:nvPr/>
-        </p:nvSpPr>
-        <p:spPr>
-          <a:xfrm>
-            <a:off x="8974966" y="646308"/>
-            <a:ext cx="2044931" cy="1367008"/>
-          </a:xfrm>
-          <a:prstGeom prst="flowChartDecision">
-            <a:avLst/>
-          </a:prstGeom>
-          <a:solidFill>
-            <a:srgbClr val="FF0000"/>
-          </a:solidFill>
-        </p:spPr>
-        <p:style>
-          <a:lnRef idx="2">
-            <a:schemeClr val="accent1">
-              <a:shade val="50000"/>
-            </a:schemeClr>
-          </a:lnRef>
-          <a:fillRef idx="1">
-            <a:schemeClr val="accent1"/>
-          </a:fillRef>
-          <a:effectRef idx="0">
-            <a:schemeClr val="accent1"/>
-          </a:effectRef>
-          <a:fontRef idx="minor">
-            <a:schemeClr val="lt1"/>
-          </a:fontRef>
-        </p:style>
-        <p:txBody>
-          <a:bodyPr rtlCol="0" anchor="ctr"/>
-          <a:lstStyle/>
-          <a:p>
-            <a:pPr algn="ctr"/>
-            <a:r>
-              <a:rPr lang="pt-BR" dirty="0" smtClean="0"/>
-              <a:t>Novo arquivo?</a:t>
-            </a:r>
-            <a:endParaRPr lang="pt-BR" dirty="0"/>
-          </a:p>
-        </p:txBody>
-      </p:sp>
-      <p:sp>
-        <p:nvSpPr>
           <p:cNvPr id="9" name="Fluxograma: Armazenamento Interno 8"/>
           <p:cNvSpPr/>
           <p:nvPr/>
@@ -4078,14 +4031,10 @@
           <a:p>
             <a:pPr algn="ctr"/>
             <a:r>
-              <a:rPr lang="pt-BR" sz="1600" dirty="0" smtClean="0"/>
-              <a:t>new</a:t>
-            </a:r>
-            <a:r>
-              <a:rPr lang="pt-BR" sz="1600" dirty="0" smtClean="0"/>
-              <a:t>.csv</a:t>
-            </a:r>
-            <a:endParaRPr lang="pt-BR" dirty="0" smtClean="0"/>
+              <a:rPr lang="pt-BR" sz="1600" dirty="0"/>
+              <a:t>resource_name.csv</a:t>
+            </a:r>
+            <a:endParaRPr lang="pt-BR" sz="1600" dirty="0"/>
           </a:p>
         </p:txBody>
       </p:sp>
@@ -4470,12 +4419,6 @@
               </a:rPr>
               <a:t>/logs</a:t>
             </a:r>
-            <a:endParaRPr lang="pt-BR" dirty="0" smtClean="0">
-              <a:solidFill>
-                <a:schemeClr val="tx1"/>
-              </a:solidFill>
-              <a:hlinkClick r:id="rId6"/>
-            </a:endParaRPr>
           </a:p>
           <a:p>
             <a:pPr algn="ctr"/>
@@ -4502,104 +4445,6 @@
                 <a:schemeClr val="tx1"/>
               </a:solidFill>
             </a:endParaRPr>
-          </a:p>
-        </p:txBody>
-      </p:sp>
-      <p:sp>
-        <p:nvSpPr>
-          <p:cNvPr id="20" name="Fluxograma: Documento 19"/>
-          <p:cNvSpPr/>
-          <p:nvPr/>
-        </p:nvSpPr>
-        <p:spPr>
-          <a:xfrm>
-            <a:off x="11105792" y="2152650"/>
-            <a:ext cx="886690" cy="656706"/>
-          </a:xfrm>
-          <a:prstGeom prst="flowChartDocument">
-            <a:avLst/>
-          </a:prstGeom>
-          <a:solidFill>
-            <a:srgbClr val="00B050"/>
-          </a:solidFill>
-        </p:spPr>
-        <p:style>
-          <a:lnRef idx="2">
-            <a:schemeClr val="accent1">
-              <a:shade val="50000"/>
-            </a:schemeClr>
-          </a:lnRef>
-          <a:fillRef idx="1">
-            <a:schemeClr val="accent1"/>
-          </a:fillRef>
-          <a:effectRef idx="0">
-            <a:schemeClr val="accent1"/>
-          </a:effectRef>
-          <a:fontRef idx="minor">
-            <a:schemeClr val="lt1"/>
-          </a:fontRef>
-        </p:style>
-        <p:txBody>
-          <a:bodyPr rtlCol="0" anchor="ctr"/>
-          <a:lstStyle/>
-          <a:p>
-            <a:pPr algn="ctr"/>
-            <a:r>
-              <a:rPr lang="pt-BR" sz="1600" dirty="0" smtClean="0"/>
-              <a:t>new</a:t>
-            </a:r>
-            <a:r>
-              <a:rPr lang="pt-BR" sz="1600" dirty="0" smtClean="0"/>
-              <a:t>.csv</a:t>
-            </a:r>
-            <a:endParaRPr lang="pt-BR" dirty="0"/>
-          </a:p>
-        </p:txBody>
-      </p:sp>
-      <p:sp>
-        <p:nvSpPr>
-          <p:cNvPr id="21" name="Fluxograma: Documento 20"/>
-          <p:cNvSpPr/>
-          <p:nvPr/>
-        </p:nvSpPr>
-        <p:spPr>
-          <a:xfrm>
-            <a:off x="10948189" y="646308"/>
-            <a:ext cx="811286" cy="614614"/>
-          </a:xfrm>
-          <a:prstGeom prst="flowChartDocument">
-            <a:avLst/>
-          </a:prstGeom>
-          <a:solidFill>
-            <a:srgbClr val="00B050"/>
-          </a:solidFill>
-        </p:spPr>
-        <p:style>
-          <a:lnRef idx="2">
-            <a:schemeClr val="accent1">
-              <a:shade val="50000"/>
-            </a:schemeClr>
-          </a:lnRef>
-          <a:fillRef idx="1">
-            <a:schemeClr val="accent1"/>
-          </a:fillRef>
-          <a:effectRef idx="0">
-            <a:schemeClr val="accent1"/>
-          </a:effectRef>
-          <a:fontRef idx="minor">
-            <a:schemeClr val="lt1"/>
-          </a:fontRef>
-        </p:style>
-        <p:txBody>
-          <a:bodyPr rtlCol="0" anchor="ctr"/>
-          <a:lstStyle/>
-          <a:p>
-            <a:pPr algn="ctr"/>
-            <a:r>
-              <a:rPr lang="pt-BR" sz="1600" dirty="0" smtClean="0"/>
-              <a:t>old.csv</a:t>
-            </a:r>
-            <a:endParaRPr lang="pt-BR" sz="1600" dirty="0"/>
           </a:p>
         </p:txBody>
       </p:sp>
@@ -4690,14 +4535,10 @@
           <a:p>
             <a:pPr algn="ctr"/>
             <a:r>
-              <a:rPr lang="pt-BR" sz="1600" dirty="0" smtClean="0"/>
-              <a:t>new</a:t>
-            </a:r>
-            <a:r>
-              <a:rPr lang="pt-BR" sz="1600" dirty="0" smtClean="0"/>
-              <a:t>.csv</a:t>
-            </a:r>
-            <a:endParaRPr lang="pt-BR" dirty="0" smtClean="0"/>
+              <a:rPr lang="pt-BR" sz="1600" dirty="0"/>
+              <a:t>resource_name.csv</a:t>
+            </a:r>
+            <a:endParaRPr lang="pt-BR" sz="1600" dirty="0"/>
           </a:p>
         </p:txBody>
       </p:sp>
@@ -4709,8 +4550,8 @@
         </p:nvSpPr>
         <p:spPr>
           <a:xfrm>
-            <a:off x="825390" y="3525639"/>
-            <a:ext cx="1260410" cy="967740"/>
+            <a:off x="800280" y="3525639"/>
+            <a:ext cx="1285520" cy="967740"/>
           </a:xfrm>
           <a:prstGeom prst="flowChartMultidocument">
             <a:avLst/>
@@ -4741,12 +4582,19 @@
           <a:p>
             <a:pPr algn="ctr"/>
             <a:r>
+              <a:rPr lang="pt-BR" sz="1600" dirty="0"/>
+              <a:t>resource_name.csv</a:t>
+            </a:r>
+          </a:p>
+          <a:p>
+            <a:pPr algn="ctr"/>
+            <a:r>
               <a:rPr lang="pt-BR" sz="1600" dirty="0" smtClean="0"/>
-              <a:t>new</a:t>
-            </a:r>
-            <a:r>
-              <a:rPr lang="pt-BR" sz="1600" dirty="0" smtClean="0"/>
-              <a:t>.csv.gz</a:t>
+              <a:t>.</a:t>
+            </a:r>
+            <a:r>
+              <a:rPr lang="pt-BR" sz="1600" dirty="0" err="1" smtClean="0"/>
+              <a:t>gz</a:t>
             </a:r>
             <a:endParaRPr lang="pt-BR" dirty="0" smtClean="0"/>
           </a:p>
@@ -4797,15 +4645,7 @@
                   <a:srgbClr val="0070C0"/>
                 </a:solidFill>
               </a:rPr>
-              <a:t>new</a:t>
-            </a:r>
-            <a:r>
-              <a:rPr lang="pt-BR" sz="1600" dirty="0" smtClean="0">
-                <a:solidFill>
-                  <a:srgbClr val="0070C0"/>
-                </a:solidFill>
-              </a:rPr>
-              <a:t>.json</a:t>
+              <a:t>new.json</a:t>
             </a:r>
             <a:endParaRPr lang="pt-BR" dirty="0" smtClean="0">
               <a:solidFill>
@@ -5003,14 +4843,14 @@
           <p:cNvPr id="37" name="Conector de Seta Reta 36"/>
           <p:cNvCxnSpPr>
             <a:stCxn id="3" idx="4"/>
-            <a:endCxn id="8" idx="1"/>
+            <a:endCxn id="59" idx="1"/>
           </p:cNvCxnSpPr>
           <p:nvPr/>
         </p:nvCxnSpPr>
         <p:spPr>
-          <a:xfrm flipV="1">
-            <a:off x="6841372" y="1329812"/>
-            <a:ext cx="2133594" cy="2653"/>
+          <a:xfrm>
+            <a:off x="6841372" y="1332465"/>
+            <a:ext cx="2380535" cy="10525"/>
           </a:xfrm>
           <a:prstGeom prst="straightConnector1">
             <a:avLst/>
@@ -5037,148 +4877,6 @@
           </a:fontRef>
         </p:style>
       </p:cxnSp>
-      <p:cxnSp>
-        <p:nvCxnSpPr>
-          <p:cNvPr id="38" name="Conector Angulado 37"/>
-          <p:cNvCxnSpPr>
-            <a:stCxn id="8" idx="0"/>
-          </p:cNvCxnSpPr>
-          <p:nvPr/>
-        </p:nvCxnSpPr>
-        <p:spPr>
-          <a:xfrm rot="5400000" flipH="1" flipV="1">
-            <a:off x="10478056" y="18572"/>
-            <a:ext cx="147113" cy="1108360"/>
-          </a:xfrm>
-          <a:prstGeom prst="bentConnector2">
-            <a:avLst/>
-          </a:prstGeom>
-          <a:ln>
-            <a:tailEnd type="triangle"/>
-          </a:ln>
-        </p:spPr>
-        <p:style>
-          <a:lnRef idx="1">
-            <a:schemeClr val="accent1"/>
-          </a:lnRef>
-          <a:fillRef idx="0">
-            <a:schemeClr val="accent1"/>
-          </a:fillRef>
-          <a:effectRef idx="0">
-            <a:schemeClr val="accent1"/>
-          </a:effectRef>
-          <a:fontRef idx="minor">
-            <a:schemeClr val="tx1"/>
-          </a:fontRef>
-        </p:style>
-      </p:cxnSp>
-      <p:cxnSp>
-        <p:nvCxnSpPr>
-          <p:cNvPr id="43" name="Conector Angulado 42"/>
-          <p:cNvCxnSpPr>
-            <a:stCxn id="8" idx="3"/>
-            <a:endCxn id="20" idx="0"/>
-          </p:cNvCxnSpPr>
-          <p:nvPr/>
-        </p:nvCxnSpPr>
-        <p:spPr>
-          <a:xfrm>
-            <a:off x="11019897" y="1329812"/>
-            <a:ext cx="529240" cy="822838"/>
-          </a:xfrm>
-          <a:prstGeom prst="bentConnector2">
-            <a:avLst/>
-          </a:prstGeom>
-          <a:ln w="25400">
-            <a:solidFill>
-              <a:schemeClr val="tx1"/>
-            </a:solidFill>
-            <a:tailEnd type="triangle" w="lg" len="lg"/>
-          </a:ln>
-        </p:spPr>
-        <p:style>
-          <a:lnRef idx="1">
-            <a:schemeClr val="accent1"/>
-          </a:lnRef>
-          <a:fillRef idx="0">
-            <a:schemeClr val="accent1"/>
-          </a:fillRef>
-          <a:effectRef idx="0">
-            <a:schemeClr val="accent1"/>
-          </a:effectRef>
-          <a:fontRef idx="minor">
-            <a:schemeClr val="tx1"/>
-          </a:fontRef>
-        </p:style>
-      </p:cxnSp>
-      <p:cxnSp>
-        <p:nvCxnSpPr>
-          <p:cNvPr id="48" name="Conector Angulado 47"/>
-          <p:cNvCxnSpPr>
-            <a:stCxn id="20" idx="2"/>
-          </p:cNvCxnSpPr>
-          <p:nvPr/>
-        </p:nvCxnSpPr>
-        <p:spPr>
-          <a:xfrm rot="5400000">
-            <a:off x="10876788" y="2663827"/>
-            <a:ext cx="570237" cy="774463"/>
-          </a:xfrm>
-          <a:prstGeom prst="bentConnector2">
-            <a:avLst/>
-          </a:prstGeom>
-          <a:ln w="25400">
-            <a:solidFill>
-              <a:schemeClr val="tx1"/>
-            </a:solidFill>
-            <a:tailEnd type="triangle" w="lg" len="lg"/>
-          </a:ln>
-        </p:spPr>
-        <p:style>
-          <a:lnRef idx="1">
-            <a:schemeClr val="accent1"/>
-          </a:lnRef>
-          <a:fillRef idx="0">
-            <a:schemeClr val="accent1"/>
-          </a:fillRef>
-          <a:effectRef idx="0">
-            <a:schemeClr val="accent1"/>
-          </a:effectRef>
-          <a:fontRef idx="minor">
-            <a:schemeClr val="tx1"/>
-          </a:fontRef>
-        </p:style>
-      </p:cxnSp>
-      <p:sp>
-        <p:nvSpPr>
-          <p:cNvPr id="46" name="CaixaDeTexto 45"/>
-          <p:cNvSpPr txBox="1"/>
-          <p:nvPr/>
-        </p:nvSpPr>
-        <p:spPr>
-          <a:xfrm>
-            <a:off x="10383973" y="499191"/>
-            <a:ext cx="538930" cy="369332"/>
-          </a:xfrm>
-          <a:prstGeom prst="rect">
-            <a:avLst/>
-          </a:prstGeom>
-          <a:noFill/>
-        </p:spPr>
-        <p:txBody>
-          <a:bodyPr wrap="none" rtlCol="0">
-            <a:spAutoFit/>
-          </a:bodyPr>
-          <a:lstStyle/>
-          <a:p>
-            <a:r>
-              <a:rPr lang="pt-BR" dirty="0" smtClean="0"/>
-              <a:t>não</a:t>
-            </a:r>
-            <a:endParaRPr lang="pt-BR" dirty="0"/>
-          </a:p>
-        </p:txBody>
-      </p:sp>
       <p:sp>
         <p:nvSpPr>
           <p:cNvPr id="53" name="CaixaDeTexto 52"/>
@@ -5204,36 +4902,6 @@
             <a:r>
               <a:rPr lang="pt-BR" dirty="0" smtClean="0"/>
               <a:t>não</a:t>
-            </a:r>
-            <a:endParaRPr lang="pt-BR" dirty="0"/>
-          </a:p>
-        </p:txBody>
-      </p:sp>
-      <p:sp>
-        <p:nvSpPr>
-          <p:cNvPr id="54" name="CaixaDeTexto 53"/>
-          <p:cNvSpPr txBox="1"/>
-          <p:nvPr/>
-        </p:nvSpPr>
-        <p:spPr>
-          <a:xfrm>
-            <a:off x="11015052" y="1501316"/>
-            <a:ext cx="511679" cy="369332"/>
-          </a:xfrm>
-          <a:prstGeom prst="rect">
-            <a:avLst/>
-          </a:prstGeom>
-          <a:noFill/>
-        </p:spPr>
-        <p:txBody>
-          <a:bodyPr wrap="none" rtlCol="0">
-            <a:spAutoFit/>
-          </a:bodyPr>
-          <a:lstStyle/>
-          <a:p>
-            <a:r>
-              <a:rPr lang="pt-BR" dirty="0"/>
-              <a:t>sim</a:t>
             </a:r>
             <a:endParaRPr lang="pt-BR" dirty="0"/>
           </a:p>
@@ -6046,18 +5714,21 @@
       </p:pic>
       <p:sp>
         <p:nvSpPr>
-          <p:cNvPr id="165" name="Fluxograma: Terminação 164"/>
+          <p:cNvPr id="59" name="Fluxograma: Documento 58"/>
           <p:cNvSpPr/>
           <p:nvPr/>
         </p:nvSpPr>
         <p:spPr>
           <a:xfrm>
-            <a:off x="11105792" y="388633"/>
-            <a:ext cx="682458" cy="199012"/>
+            <a:off x="9221907" y="999998"/>
+            <a:ext cx="1924162" cy="685984"/>
           </a:xfrm>
-          <a:prstGeom prst="flowChartTerminator">
+          <a:prstGeom prst="flowChartDocument">
             <a:avLst/>
           </a:prstGeom>
+          <a:solidFill>
+            <a:srgbClr val="00B050"/>
+          </a:solidFill>
         </p:spPr>
         <p:style>
           <a:lnRef idx="2">
@@ -6080,10 +5751,56 @@
           <a:lstStyle/>
           <a:p>
             <a:pPr algn="ctr"/>
-            <a:endParaRPr lang="pt-BR"/>
-          </a:p>
-        </p:txBody>
-      </p:sp>
+            <a:r>
+              <a:rPr lang="pt-BR" sz="1600" dirty="0"/>
+              <a:t>r</a:t>
+            </a:r>
+            <a:r>
+              <a:rPr lang="pt-BR" sz="1600" dirty="0" smtClean="0"/>
+              <a:t>esource_name.csv</a:t>
+            </a:r>
+            <a:endParaRPr lang="pt-BR" dirty="0"/>
+          </a:p>
+        </p:txBody>
+      </p:sp>
+      <p:cxnSp>
+        <p:nvCxnSpPr>
+          <p:cNvPr id="25" name="Conector Angulado 24"/>
+          <p:cNvCxnSpPr>
+            <a:stCxn id="59" idx="3"/>
+            <a:endCxn id="10" idx="3"/>
+          </p:cNvCxnSpPr>
+          <p:nvPr/>
+        </p:nvCxnSpPr>
+        <p:spPr>
+          <a:xfrm flipH="1">
+            <a:off x="10974177" y="1342989"/>
+            <a:ext cx="216000" cy="2376000"/>
+          </a:xfrm>
+          <a:prstGeom prst="bentConnector3">
+            <a:avLst>
+              <a:gd name="adj1" fmla="val -132990"/>
+            </a:avLst>
+          </a:prstGeom>
+          <a:ln w="28575">
+            <a:tailEnd type="triangle"/>
+          </a:ln>
+        </p:spPr>
+        <p:style>
+          <a:lnRef idx="1">
+            <a:schemeClr val="dk1"/>
+          </a:lnRef>
+          <a:fillRef idx="0">
+            <a:schemeClr val="dk1"/>
+          </a:fillRef>
+          <a:effectRef idx="0">
+            <a:schemeClr val="dk1"/>
+          </a:effectRef>
+          <a:fontRef idx="minor">
+            <a:schemeClr val="tx1"/>
+          </a:fontRef>
+        </p:style>
+      </p:cxnSp>
     </p:spTree>
     <p:extLst>
       <p:ext uri="{BB962C8B-B14F-4D97-AF65-F5344CB8AC3E}">
@@ -6428,7 +6145,7 @@
                               <p:par>
                                 <p:cTn id="33" presetID="10" presetClass="entr" presetSubtype="0" fill="hold" grpId="0" nodeType="afterEffect">
                                   <p:stCondLst>
-                                    <p:cond delay="500"/>
+                                    <p:cond delay="0"/>
                                   </p:stCondLst>
                                   <p:childTnLst>
                                     <p:set>
@@ -6439,7 +6156,7 @@
                                           </p:stCondLst>
                                         </p:cTn>
                                         <p:tgtEl>
-                                          <p:spTgt spid="8"/>
+                                          <p:spTgt spid="9"/>
                                         </p:tgtEl>
                                         <p:attrNameLst>
                                           <p:attrName>style.visibility</p:attrName>
@@ -6453,7 +6170,7 @@
                                       <p:cBhvr>
                                         <p:cTn id="35" dur="1000"/>
                                         <p:tgtEl>
-                                          <p:spTgt spid="8"/>
+                                          <p:spTgt spid="9"/>
                                         </p:tgtEl>
                                       </p:cBhvr>
                                     </p:animEffect>
@@ -6466,13 +6183,13 @@
                         <p:par>
                           <p:cTn id="36" fill="hold">
                             <p:stCondLst>
-                              <p:cond delay="12000"/>
+                              <p:cond delay="11500"/>
                             </p:stCondLst>
                             <p:childTnLst>
                               <p:par>
                                 <p:cTn id="37" presetID="10" presetClass="entr" presetSubtype="0" fill="hold" grpId="0" nodeType="afterEffect">
                                   <p:stCondLst>
-                                    <p:cond delay="500"/>
+                                    <p:cond delay="0"/>
                                   </p:stCondLst>
                                   <p:childTnLst>
                                     <p:set>
@@ -6483,7 +6200,7 @@
                                           </p:stCondLst>
                                         </p:cTn>
                                         <p:tgtEl>
-                                          <p:spTgt spid="21"/>
+                                          <p:spTgt spid="10"/>
                                         </p:tgtEl>
                                         <p:attrNameLst>
                                           <p:attrName>style.visibility</p:attrName>
@@ -6497,7 +6214,7 @@
                                       <p:cBhvr>
                                         <p:cTn id="39" dur="1000"/>
                                         <p:tgtEl>
-                                          <p:spTgt spid="21"/>
+                                          <p:spTgt spid="10"/>
                                         </p:tgtEl>
                                       </p:cBhvr>
                                     </p:animEffect>
@@ -6510,13 +6227,13 @@
                         <p:par>
                           <p:cTn id="40" fill="hold">
                             <p:stCondLst>
-                              <p:cond delay="13500"/>
+                              <p:cond delay="12500"/>
                             </p:stCondLst>
                             <p:childTnLst>
                               <p:par>
-                                <p:cTn id="41" presetID="10" presetClass="entr" presetSubtype="0" fill="hold" grpId="0" nodeType="afterEffect">
+                                <p:cTn id="41" presetID="10" presetClass="entr" presetSubtype="0" fill="hold" nodeType="afterEffect">
                                   <p:stCondLst>
-                                    <p:cond delay="500"/>
+                                    <p:cond delay="0"/>
                                   </p:stCondLst>
                                   <p:childTnLst>
                                     <p:set>
@@ -6527,7 +6244,7 @@
                                           </p:stCondLst>
                                         </p:cTn>
                                         <p:tgtEl>
-                                          <p:spTgt spid="46"/>
+                                          <p:spTgt spid="49"/>
                                         </p:tgtEl>
                                         <p:attrNameLst>
                                           <p:attrName>style.visibility</p:attrName>
@@ -6541,7 +6258,7 @@
                                       <p:cBhvr>
                                         <p:cTn id="43" dur="1000"/>
                                         <p:tgtEl>
-                                          <p:spTgt spid="46"/>
+                                          <p:spTgt spid="49"/>
                                         </p:tgtEl>
                                       </p:cBhvr>
                                     </p:animEffect>
@@ -6554,13 +6271,13 @@
                         <p:par>
                           <p:cTn id="44" fill="hold">
                             <p:stCondLst>
-                              <p:cond delay="15000"/>
+                              <p:cond delay="13500"/>
                             </p:stCondLst>
                             <p:childTnLst>
                               <p:par>
-                                <p:cTn id="45" presetID="10" presetClass="entr" presetSubtype="0" fill="hold" nodeType="afterEffect">
+                                <p:cTn id="45" presetID="10" presetClass="entr" presetSubtype="0" fill="hold" grpId="0" nodeType="afterEffect">
                                   <p:stCondLst>
-                                    <p:cond delay="500"/>
+                                    <p:cond delay="0"/>
                                   </p:stCondLst>
                                   <p:childTnLst>
                                     <p:set>
@@ -6571,7 +6288,7 @@
                                           </p:stCondLst>
                                         </p:cTn>
                                         <p:tgtEl>
-                                          <p:spTgt spid="38"/>
+                                          <p:spTgt spid="11"/>
                                         </p:tgtEl>
                                         <p:attrNameLst>
                                           <p:attrName>style.visibility</p:attrName>
@@ -6585,7 +6302,7 @@
                                       <p:cBhvr>
                                         <p:cTn id="47" dur="1000"/>
                                         <p:tgtEl>
-                                          <p:spTgt spid="38"/>
+                                          <p:spTgt spid="11"/>
                                         </p:tgtEl>
                                       </p:cBhvr>
                                     </p:animEffect>
@@ -6598,11 +6315,11 @@
                         <p:par>
                           <p:cTn id="48" fill="hold">
                             <p:stCondLst>
-                              <p:cond delay="16500"/>
+                              <p:cond delay="14500"/>
                             </p:stCondLst>
                             <p:childTnLst>
                               <p:par>
-                                <p:cTn id="49" presetID="10" presetClass="entr" presetSubtype="0" fill="hold" grpId="0" nodeType="afterEffect">
+                                <p:cTn id="49" presetID="10" presetClass="entr" presetSubtype="0" fill="hold" nodeType="afterEffect">
                                   <p:stCondLst>
                                     <p:cond delay="0"/>
                                   </p:stCondLst>
@@ -6615,7 +6332,7 @@
                                           </p:stCondLst>
                                         </p:cTn>
                                         <p:tgtEl>
-                                          <p:spTgt spid="165"/>
+                                          <p:spTgt spid="91"/>
                                         </p:tgtEl>
                                         <p:attrNameLst>
                                           <p:attrName>style.visibility</p:attrName>
@@ -6629,7 +6346,7 @@
                                       <p:cBhvr>
                                         <p:cTn id="51" dur="1000"/>
                                         <p:tgtEl>
-                                          <p:spTgt spid="165"/>
+                                          <p:spTgt spid="91"/>
                                         </p:tgtEl>
                                       </p:cBhvr>
                                     </p:animEffect>
@@ -6642,7 +6359,7 @@
                         <p:par>
                           <p:cTn id="52" fill="hold">
                             <p:stCondLst>
-                              <p:cond delay="17500"/>
+                              <p:cond delay="15500"/>
                             </p:stCondLst>
                             <p:childTnLst>
                               <p:par>
@@ -6659,7 +6376,7 @@
                                           </p:stCondLst>
                                         </p:cTn>
                                         <p:tgtEl>
-                                          <p:spTgt spid="20"/>
+                                          <p:spTgt spid="23"/>
                                         </p:tgtEl>
                                         <p:attrNameLst>
                                           <p:attrName>style.visibility</p:attrName>
@@ -6673,7 +6390,7 @@
                                       <p:cBhvr>
                                         <p:cTn id="55" dur="1000"/>
                                         <p:tgtEl>
-                                          <p:spTgt spid="20"/>
+                                          <p:spTgt spid="23"/>
                                         </p:tgtEl>
                                       </p:cBhvr>
                                     </p:animEffect>
@@ -6686,7 +6403,7 @@
                         <p:par>
                           <p:cTn id="56" fill="hold">
                             <p:stCondLst>
-                              <p:cond delay="18500"/>
+                              <p:cond delay="16500"/>
                             </p:stCondLst>
                             <p:childTnLst>
                               <p:par>
@@ -6703,7 +6420,7 @@
                                           </p:stCondLst>
                                         </p:cTn>
                                         <p:tgtEl>
-                                          <p:spTgt spid="54"/>
+                                          <p:spTgt spid="53"/>
                                         </p:tgtEl>
                                         <p:attrNameLst>
                                           <p:attrName>style.visibility</p:attrName>
@@ -6717,7 +6434,7 @@
                                       <p:cBhvr>
                                         <p:cTn id="59" dur="1000"/>
                                         <p:tgtEl>
-                                          <p:spTgt spid="54"/>
+                                          <p:spTgt spid="53"/>
                                         </p:tgtEl>
                                       </p:cBhvr>
                                     </p:animEffect>
@@ -6730,7 +6447,7 @@
                         <p:par>
                           <p:cTn id="60" fill="hold">
                             <p:stCondLst>
-                              <p:cond delay="19500"/>
+                              <p:cond delay="17500"/>
                             </p:stCondLst>
                             <p:childTnLst>
                               <p:par>
@@ -6747,7 +6464,7 @@
                                           </p:stCondLst>
                                         </p:cTn>
                                         <p:tgtEl>
-                                          <p:spTgt spid="43"/>
+                                          <p:spTgt spid="1075"/>
                                         </p:tgtEl>
                                         <p:attrNameLst>
                                           <p:attrName>style.visibility</p:attrName>
@@ -6761,7 +6478,7 @@
                                       <p:cBhvr>
                                         <p:cTn id="63" dur="1000"/>
                                         <p:tgtEl>
-                                          <p:spTgt spid="43"/>
+                                          <p:spTgt spid="1075"/>
                                         </p:tgtEl>
                                       </p:cBhvr>
                                     </p:animEffect>
@@ -6774,11 +6491,11 @@
                         <p:par>
                           <p:cTn id="64" fill="hold">
                             <p:stCondLst>
-                              <p:cond delay="20500"/>
+                              <p:cond delay="18500"/>
                             </p:stCondLst>
                             <p:childTnLst>
                               <p:par>
-                                <p:cTn id="65" presetID="10" presetClass="entr" presetSubtype="0" fill="hold" nodeType="afterEffect">
+                                <p:cTn id="65" presetID="10" presetClass="entr" presetSubtype="0" fill="hold" grpId="0" nodeType="afterEffect">
                                   <p:stCondLst>
                                     <p:cond delay="0"/>
                                   </p:stCondLst>
@@ -6791,7 +6508,7 @@
                                           </p:stCondLst>
                                         </p:cTn>
                                         <p:tgtEl>
-                                          <p:spTgt spid="48"/>
+                                          <p:spTgt spid="1073"/>
                                         </p:tgtEl>
                                         <p:attrNameLst>
                                           <p:attrName>style.visibility</p:attrName>
@@ -6805,7 +6522,7 @@
                                       <p:cBhvr>
                                         <p:cTn id="67" dur="1000"/>
                                         <p:tgtEl>
-                                          <p:spTgt spid="48"/>
+                                          <p:spTgt spid="1073"/>
                                         </p:tgtEl>
                                       </p:cBhvr>
                                     </p:animEffect>
@@ -6818,7 +6535,7 @@
                         <p:par>
                           <p:cTn id="68" fill="hold">
                             <p:stCondLst>
-                              <p:cond delay="21500"/>
+                              <p:cond delay="19500"/>
                             </p:stCondLst>
                             <p:childTnLst>
                               <p:par>
@@ -6835,7 +6552,7 @@
                                           </p:stCondLst>
                                         </p:cTn>
                                         <p:tgtEl>
-                                          <p:spTgt spid="9"/>
+                                          <p:spTgt spid="55"/>
                                         </p:tgtEl>
                                         <p:attrNameLst>
                                           <p:attrName>style.visibility</p:attrName>
@@ -6849,7 +6566,7 @@
                                       <p:cBhvr>
                                         <p:cTn id="71" dur="1000"/>
                                         <p:tgtEl>
-                                          <p:spTgt spid="9"/>
+                                          <p:spTgt spid="55"/>
                                         </p:tgtEl>
                                       </p:cBhvr>
                                     </p:animEffect>
@@ -6862,11 +6579,11 @@
                         <p:par>
                           <p:cTn id="72" fill="hold">
                             <p:stCondLst>
-                              <p:cond delay="22500"/>
+                              <p:cond delay="20500"/>
                             </p:stCondLst>
                             <p:childTnLst>
                               <p:par>
-                                <p:cTn id="73" presetID="10" presetClass="entr" presetSubtype="0" fill="hold" grpId="0" nodeType="afterEffect">
+                                <p:cTn id="73" presetID="10" presetClass="entr" presetSubtype="0" fill="hold" nodeType="afterEffect">
                                   <p:stCondLst>
                                     <p:cond delay="0"/>
                                   </p:stCondLst>
@@ -6879,7 +6596,7 @@
                                           </p:stCondLst>
                                         </p:cTn>
                                         <p:tgtEl>
-                                          <p:spTgt spid="10"/>
+                                          <p:spTgt spid="56"/>
                                         </p:tgtEl>
                                         <p:attrNameLst>
                                           <p:attrName>style.visibility</p:attrName>
@@ -6893,7 +6610,7 @@
                                       <p:cBhvr>
                                         <p:cTn id="75" dur="1000"/>
                                         <p:tgtEl>
-                                          <p:spTgt spid="10"/>
+                                          <p:spTgt spid="56"/>
                                         </p:tgtEl>
                                       </p:cBhvr>
                                     </p:animEffect>
@@ -6906,11 +6623,11 @@
                         <p:par>
                           <p:cTn id="76" fill="hold">
                             <p:stCondLst>
-                              <p:cond delay="23500"/>
+                              <p:cond delay="21500"/>
                             </p:stCondLst>
                             <p:childTnLst>
                               <p:par>
-                                <p:cTn id="77" presetID="10" presetClass="entr" presetSubtype="0" fill="hold" nodeType="afterEffect">
+                                <p:cTn id="77" presetID="10" presetClass="entr" presetSubtype="0" fill="hold" grpId="0" nodeType="afterEffect">
                                   <p:stCondLst>
                                     <p:cond delay="0"/>
                                   </p:stCondLst>
@@ -6923,7 +6640,7 @@
                                           </p:stCondLst>
                                         </p:cTn>
                                         <p:tgtEl>
-                                          <p:spTgt spid="49"/>
+                                          <p:spTgt spid="7"/>
                                         </p:tgtEl>
                                         <p:attrNameLst>
                                           <p:attrName>style.visibility</p:attrName>
@@ -6937,7 +6654,7 @@
                                       <p:cBhvr>
                                         <p:cTn id="79" dur="1000"/>
                                         <p:tgtEl>
-                                          <p:spTgt spid="49"/>
+                                          <p:spTgt spid="7"/>
                                         </p:tgtEl>
                                       </p:cBhvr>
                                     </p:animEffect>
@@ -6950,11 +6667,11 @@
                         <p:par>
                           <p:cTn id="80" fill="hold">
                             <p:stCondLst>
-                              <p:cond delay="24500"/>
+                              <p:cond delay="22500"/>
                             </p:stCondLst>
                             <p:childTnLst>
                               <p:par>
-                                <p:cTn id="81" presetID="10" presetClass="entr" presetSubtype="0" fill="hold" grpId="0" nodeType="afterEffect">
+                                <p:cTn id="81" presetID="10" presetClass="entr" presetSubtype="0" fill="hold" nodeType="afterEffect">
                                   <p:stCondLst>
                                     <p:cond delay="0"/>
                                   </p:stCondLst>
@@ -6967,7 +6684,7 @@
                                           </p:stCondLst>
                                         </p:cTn>
                                         <p:tgtEl>
-                                          <p:spTgt spid="11"/>
+                                          <p:spTgt spid="63"/>
                                         </p:tgtEl>
                                         <p:attrNameLst>
                                           <p:attrName>style.visibility</p:attrName>
@@ -6981,7 +6698,7 @@
                                       <p:cBhvr>
                                         <p:cTn id="83" dur="1000"/>
                                         <p:tgtEl>
-                                          <p:spTgt spid="11"/>
+                                          <p:spTgt spid="63"/>
                                         </p:tgtEl>
                                       </p:cBhvr>
                                     </p:animEffect>
@@ -6994,11 +6711,11 @@
                         <p:par>
                           <p:cTn id="84" fill="hold">
                             <p:stCondLst>
-                              <p:cond delay="25500"/>
+                              <p:cond delay="23500"/>
                             </p:stCondLst>
                             <p:childTnLst>
                               <p:par>
-                                <p:cTn id="85" presetID="10" presetClass="entr" presetSubtype="0" fill="hold" nodeType="afterEffect">
+                                <p:cTn id="85" presetID="10" presetClass="entr" presetSubtype="0" fill="hold" grpId="0" nodeType="afterEffect">
                                   <p:stCondLst>
                                     <p:cond delay="0"/>
                                   </p:stCondLst>
@@ -7011,7 +6728,7 @@
                                           </p:stCondLst>
                                         </p:cTn>
                                         <p:tgtEl>
-                                          <p:spTgt spid="91"/>
+                                          <p:spTgt spid="14"/>
                                         </p:tgtEl>
                                         <p:attrNameLst>
                                           <p:attrName>style.visibility</p:attrName>
@@ -7025,7 +6742,7 @@
                                       <p:cBhvr>
                                         <p:cTn id="87" dur="1000"/>
                                         <p:tgtEl>
-                                          <p:spTgt spid="91"/>
+                                          <p:spTgt spid="14"/>
                                         </p:tgtEl>
                                       </p:cBhvr>
                                     </p:animEffect>
@@ -7038,7 +6755,7 @@
                         <p:par>
                           <p:cTn id="88" fill="hold">
                             <p:stCondLst>
-                              <p:cond delay="26500"/>
+                              <p:cond delay="24500"/>
                             </p:stCondLst>
                             <p:childTnLst>
                               <p:par>
@@ -7055,7 +6772,7 @@
                                           </p:stCondLst>
                                         </p:cTn>
                                         <p:tgtEl>
-                                          <p:spTgt spid="23"/>
+                                          <p:spTgt spid="26"/>
                                         </p:tgtEl>
                                         <p:attrNameLst>
                                           <p:attrName>style.visibility</p:attrName>
@@ -7069,7 +6786,7 @@
                                       <p:cBhvr>
                                         <p:cTn id="91" dur="1000"/>
                                         <p:tgtEl>
-                                          <p:spTgt spid="23"/>
+                                          <p:spTgt spid="26"/>
                                         </p:tgtEl>
                                       </p:cBhvr>
                                     </p:animEffect>
@@ -7082,11 +6799,11 @@
                         <p:par>
                           <p:cTn id="92" fill="hold">
                             <p:stCondLst>
-                              <p:cond delay="27500"/>
+                              <p:cond delay="25500"/>
                             </p:stCondLst>
                             <p:childTnLst>
                               <p:par>
-                                <p:cTn id="93" presetID="10" presetClass="entr" presetSubtype="0" fill="hold" grpId="0" nodeType="afterEffect">
+                                <p:cTn id="93" presetID="10" presetClass="entr" presetSubtype="0" fill="hold" nodeType="afterEffect">
                                   <p:stCondLst>
                                     <p:cond delay="0"/>
                                   </p:stCondLst>
@@ -7099,7 +6816,7 @@
                                           </p:stCondLst>
                                         </p:cTn>
                                         <p:tgtEl>
-                                          <p:spTgt spid="53"/>
+                                          <p:spTgt spid="70"/>
                                         </p:tgtEl>
                                         <p:attrNameLst>
                                           <p:attrName>style.visibility</p:attrName>
@@ -7113,7 +6830,7 @@
                                       <p:cBhvr>
                                         <p:cTn id="95" dur="1000"/>
                                         <p:tgtEl>
-                                          <p:spTgt spid="53"/>
+                                          <p:spTgt spid="70"/>
                                         </p:tgtEl>
                                       </p:cBhvr>
                                     </p:animEffect>
@@ -7126,11 +6843,11 @@
                         <p:par>
                           <p:cTn id="96" fill="hold">
                             <p:stCondLst>
-                              <p:cond delay="28500"/>
+                              <p:cond delay="26500"/>
                             </p:stCondLst>
                             <p:childTnLst>
                               <p:par>
-                                <p:cTn id="97" presetID="10" presetClass="entr" presetSubtype="0" fill="hold" nodeType="afterEffect">
+                                <p:cTn id="97" presetID="10" presetClass="entr" presetSubtype="0" fill="hold" grpId="0" nodeType="afterEffect">
                                   <p:stCondLst>
                                     <p:cond delay="0"/>
                                   </p:stCondLst>
@@ -7143,7 +6860,7 @@
                                           </p:stCondLst>
                                         </p:cTn>
                                         <p:tgtEl>
-                                          <p:spTgt spid="1075"/>
+                                          <p:spTgt spid="16"/>
                                         </p:tgtEl>
                                         <p:attrNameLst>
                                           <p:attrName>style.visibility</p:attrName>
@@ -7157,7 +6874,7 @@
                                       <p:cBhvr>
                                         <p:cTn id="99" dur="1000"/>
                                         <p:tgtEl>
-                                          <p:spTgt spid="1075"/>
+                                          <p:spTgt spid="16"/>
                                         </p:tgtEl>
                                       </p:cBhvr>
                                     </p:animEffect>
@@ -7170,11 +6887,11 @@
                         <p:par>
                           <p:cTn id="100" fill="hold">
                             <p:stCondLst>
-                              <p:cond delay="29500"/>
+                              <p:cond delay="27500"/>
                             </p:stCondLst>
                             <p:childTnLst>
                               <p:par>
-                                <p:cTn id="101" presetID="10" presetClass="entr" presetSubtype="0" fill="hold" grpId="0" nodeType="afterEffect">
+                                <p:cTn id="101" presetID="10" presetClass="entr" presetSubtype="0" fill="hold" nodeType="afterEffect">
                                   <p:stCondLst>
                                     <p:cond delay="0"/>
                                   </p:stCondLst>
@@ -7187,7 +6904,7 @@
                                           </p:stCondLst>
                                         </p:cTn>
                                         <p:tgtEl>
-                                          <p:spTgt spid="1073"/>
+                                          <p:spTgt spid="1047"/>
                                         </p:tgtEl>
                                         <p:attrNameLst>
                                           <p:attrName>style.visibility</p:attrName>
@@ -7201,7 +6918,7 @@
                                       <p:cBhvr>
                                         <p:cTn id="103" dur="1000"/>
                                         <p:tgtEl>
-                                          <p:spTgt spid="1073"/>
+                                          <p:spTgt spid="1047"/>
                                         </p:tgtEl>
                                       </p:cBhvr>
                                     </p:animEffect>
@@ -7214,11 +6931,11 @@
                         <p:par>
                           <p:cTn id="104" fill="hold">
                             <p:stCondLst>
-                              <p:cond delay="30500"/>
+                              <p:cond delay="28500"/>
                             </p:stCondLst>
                             <p:childTnLst>
                               <p:par>
-                                <p:cTn id="105" presetID="10" presetClass="entr" presetSubtype="0" fill="hold" grpId="0" nodeType="afterEffect">
+                                <p:cTn id="105" presetID="10" presetClass="entr" presetSubtype="0" fill="hold" nodeType="afterEffect">
                                   <p:stCondLst>
                                     <p:cond delay="0"/>
                                   </p:stCondLst>
@@ -7231,7 +6948,7 @@
                                           </p:stCondLst>
                                         </p:cTn>
                                         <p:tgtEl>
-                                          <p:spTgt spid="55"/>
+                                          <p:spTgt spid="73"/>
                                         </p:tgtEl>
                                         <p:attrNameLst>
                                           <p:attrName>style.visibility</p:attrName>
@@ -7245,7 +6962,7 @@
                                       <p:cBhvr>
                                         <p:cTn id="107" dur="1000"/>
                                         <p:tgtEl>
-                                          <p:spTgt spid="55"/>
+                                          <p:spTgt spid="73"/>
                                         </p:tgtEl>
                                       </p:cBhvr>
                                     </p:animEffect>
@@ -7258,11 +6975,11 @@
                         <p:par>
                           <p:cTn id="108" fill="hold">
                             <p:stCondLst>
-                              <p:cond delay="31500"/>
+                              <p:cond delay="29500"/>
                             </p:stCondLst>
                             <p:childTnLst>
                               <p:par>
-                                <p:cTn id="109" presetID="10" presetClass="entr" presetSubtype="0" fill="hold" nodeType="afterEffect">
+                                <p:cTn id="109" presetID="10" presetClass="entr" presetSubtype="0" fill="hold" grpId="0" nodeType="afterEffect">
                                   <p:stCondLst>
                                     <p:cond delay="0"/>
                                   </p:stCondLst>
@@ -7275,7 +6992,7 @@
                                           </p:stCondLst>
                                         </p:cTn>
                                         <p:tgtEl>
-                                          <p:spTgt spid="56"/>
+                                          <p:spTgt spid="15"/>
                                         </p:tgtEl>
                                         <p:attrNameLst>
                                           <p:attrName>style.visibility</p:attrName>
@@ -7289,7 +7006,7 @@
                                       <p:cBhvr>
                                         <p:cTn id="111" dur="1000"/>
                                         <p:tgtEl>
-                                          <p:spTgt spid="56"/>
+                                          <p:spTgt spid="15"/>
                                         </p:tgtEl>
                                       </p:cBhvr>
                                     </p:animEffect>
@@ -7302,7 +7019,7 @@
                         <p:par>
                           <p:cTn id="112" fill="hold">
                             <p:stCondLst>
-                              <p:cond delay="32500"/>
+                              <p:cond delay="30500"/>
                             </p:stCondLst>
                             <p:childTnLst>
                               <p:par>
@@ -7319,7 +7036,7 @@
                                           </p:stCondLst>
                                         </p:cTn>
                                         <p:tgtEl>
-                                          <p:spTgt spid="7"/>
+                                          <p:spTgt spid="27"/>
                                         </p:tgtEl>
                                         <p:attrNameLst>
                                           <p:attrName>style.visibility</p:attrName>
@@ -7333,7 +7050,7 @@
                                       <p:cBhvr>
                                         <p:cTn id="115" dur="1000"/>
                                         <p:tgtEl>
-                                          <p:spTgt spid="7"/>
+                                          <p:spTgt spid="27"/>
                                         </p:tgtEl>
                                       </p:cBhvr>
                                     </p:animEffect>
@@ -7346,7 +7063,7 @@
                         <p:par>
                           <p:cTn id="116" fill="hold">
                             <p:stCondLst>
-                              <p:cond delay="33500"/>
+                              <p:cond delay="31500"/>
                             </p:stCondLst>
                             <p:childTnLst>
                               <p:par>
@@ -7363,7 +7080,7 @@
                                           </p:stCondLst>
                                         </p:cTn>
                                         <p:tgtEl>
-                                          <p:spTgt spid="63"/>
+                                          <p:spTgt spid="1038"/>
                                         </p:tgtEl>
                                         <p:attrNameLst>
                                           <p:attrName>style.visibility</p:attrName>
@@ -7377,7 +7094,7 @@
                                       <p:cBhvr>
                                         <p:cTn id="119" dur="1000"/>
                                         <p:tgtEl>
-                                          <p:spTgt spid="63"/>
+                                          <p:spTgt spid="1038"/>
                                         </p:tgtEl>
                                       </p:cBhvr>
                                     </p:animEffect>
@@ -7390,7 +7107,7 @@
                         <p:par>
                           <p:cTn id="120" fill="hold">
                             <p:stCondLst>
-                              <p:cond delay="34500"/>
+                              <p:cond delay="32500"/>
                             </p:stCondLst>
                             <p:childTnLst>
                               <p:par>
@@ -7407,7 +7124,7 @@
                                           </p:stCondLst>
                                         </p:cTn>
                                         <p:tgtEl>
-                                          <p:spTgt spid="14"/>
+                                          <p:spTgt spid="17"/>
                                         </p:tgtEl>
                                         <p:attrNameLst>
                                           <p:attrName>style.visibility</p:attrName>
@@ -7421,7 +7138,7 @@
                                       <p:cBhvr>
                                         <p:cTn id="123" dur="1000"/>
                                         <p:tgtEl>
-                                          <p:spTgt spid="14"/>
+                                          <p:spTgt spid="17"/>
                                         </p:tgtEl>
                                       </p:cBhvr>
                                     </p:animEffect>
@@ -7434,11 +7151,11 @@
                         <p:par>
                           <p:cTn id="124" fill="hold">
                             <p:stCondLst>
-                              <p:cond delay="35500"/>
+                              <p:cond delay="33500"/>
                             </p:stCondLst>
                             <p:childTnLst>
                               <p:par>
-                                <p:cTn id="125" presetID="10" presetClass="entr" presetSubtype="0" fill="hold" grpId="0" nodeType="afterEffect">
+                                <p:cTn id="125" presetID="10" presetClass="entr" presetSubtype="0" fill="hold" nodeType="afterEffect">
                                   <p:stCondLst>
                                     <p:cond delay="0"/>
                                   </p:stCondLst>
@@ -7451,7 +7168,7 @@
                                           </p:stCondLst>
                                         </p:cTn>
                                         <p:tgtEl>
-                                          <p:spTgt spid="26"/>
+                                          <p:spTgt spid="1048"/>
                                         </p:tgtEl>
                                         <p:attrNameLst>
                                           <p:attrName>style.visibility</p:attrName>
@@ -7465,7 +7182,7 @@
                                       <p:cBhvr>
                                         <p:cTn id="127" dur="1000"/>
                                         <p:tgtEl>
-                                          <p:spTgt spid="26"/>
+                                          <p:spTgt spid="1048"/>
                                         </p:tgtEl>
                                       </p:cBhvr>
                                     </p:animEffect>
@@ -7478,7 +7195,7 @@
                         <p:par>
                           <p:cTn id="128" fill="hold">
                             <p:stCondLst>
-                              <p:cond delay="36500"/>
+                              <p:cond delay="34500"/>
                             </p:stCondLst>
                             <p:childTnLst>
                               <p:par>
@@ -7495,7 +7212,7 @@
                                           </p:stCondLst>
                                         </p:cTn>
                                         <p:tgtEl>
-                                          <p:spTgt spid="70"/>
+                                          <p:spTgt spid="82"/>
                                         </p:tgtEl>
                                         <p:attrNameLst>
                                           <p:attrName>style.visibility</p:attrName>
@@ -7509,7 +7226,7 @@
                                       <p:cBhvr>
                                         <p:cTn id="131" dur="1000"/>
                                         <p:tgtEl>
-                                          <p:spTgt spid="70"/>
+                                          <p:spTgt spid="82"/>
                                         </p:tgtEl>
                                       </p:cBhvr>
                                     </p:animEffect>
@@ -7522,7 +7239,7 @@
                         <p:par>
                           <p:cTn id="132" fill="hold">
                             <p:stCondLst>
-                              <p:cond delay="37500"/>
+                              <p:cond delay="35500"/>
                             </p:stCondLst>
                             <p:childTnLst>
                               <p:par>
@@ -7539,7 +7256,7 @@
                                           </p:stCondLst>
                                         </p:cTn>
                                         <p:tgtEl>
-                                          <p:spTgt spid="16"/>
+                                          <p:spTgt spid="19"/>
                                         </p:tgtEl>
                                         <p:attrNameLst>
                                           <p:attrName>style.visibility</p:attrName>
@@ -7553,7 +7270,7 @@
                                       <p:cBhvr>
                                         <p:cTn id="135" dur="1000"/>
                                         <p:tgtEl>
-                                          <p:spTgt spid="16"/>
+                                          <p:spTgt spid="19"/>
                                         </p:tgtEl>
                                       </p:cBhvr>
                                     </p:animEffect>
@@ -7566,11 +7283,11 @@
                         <p:par>
                           <p:cTn id="136" fill="hold">
                             <p:stCondLst>
-                              <p:cond delay="38500"/>
+                              <p:cond delay="36500"/>
                             </p:stCondLst>
                             <p:childTnLst>
                               <p:par>
-                                <p:cTn id="137" presetID="10" presetClass="entr" presetSubtype="0" fill="hold" nodeType="afterEffect">
+                                <p:cTn id="137" presetID="10" presetClass="entr" presetSubtype="0" fill="hold" grpId="0" nodeType="afterEffect">
                                   <p:stCondLst>
                                     <p:cond delay="0"/>
                                   </p:stCondLst>
@@ -7583,7 +7300,7 @@
                                           </p:stCondLst>
                                         </p:cTn>
                                         <p:tgtEl>
-                                          <p:spTgt spid="1047"/>
+                                          <p:spTgt spid="29"/>
                                         </p:tgtEl>
                                         <p:attrNameLst>
                                           <p:attrName>style.visibility</p:attrName>
@@ -7597,7 +7314,7 @@
                                       <p:cBhvr>
                                         <p:cTn id="139" dur="1000"/>
                                         <p:tgtEl>
-                                          <p:spTgt spid="1047"/>
+                                          <p:spTgt spid="29"/>
                                         </p:tgtEl>
                                       </p:cBhvr>
                                     </p:animEffect>
@@ -7610,7 +7327,7 @@
                         <p:par>
                           <p:cTn id="140" fill="hold">
                             <p:stCondLst>
-                              <p:cond delay="39500"/>
+                              <p:cond delay="37500"/>
                             </p:stCondLst>
                             <p:childTnLst>
                               <p:par>
@@ -7627,7 +7344,7 @@
                                           </p:stCondLst>
                                         </p:cTn>
                                         <p:tgtEl>
-                                          <p:spTgt spid="73"/>
+                                          <p:spTgt spid="85"/>
                                         </p:tgtEl>
                                         <p:attrNameLst>
                                           <p:attrName>style.visibility</p:attrName>
@@ -7641,7 +7358,7 @@
                                       <p:cBhvr>
                                         <p:cTn id="143" dur="1000"/>
                                         <p:tgtEl>
-                                          <p:spTgt spid="73"/>
+                                          <p:spTgt spid="85"/>
                                         </p:tgtEl>
                                       </p:cBhvr>
                                     </p:animEffect>
@@ -7654,7 +7371,7 @@
                         <p:par>
                           <p:cTn id="144" fill="hold">
                             <p:stCondLst>
-                              <p:cond delay="40500"/>
+                              <p:cond delay="38500"/>
                             </p:stCondLst>
                             <p:childTnLst>
                               <p:par>
@@ -7671,7 +7388,7 @@
                                           </p:stCondLst>
                                         </p:cTn>
                                         <p:tgtEl>
-                                          <p:spTgt spid="15"/>
+                                          <p:spTgt spid="18"/>
                                         </p:tgtEl>
                                         <p:attrNameLst>
                                           <p:attrName>style.visibility</p:attrName>
@@ -7685,7 +7402,7 @@
                                       <p:cBhvr>
                                         <p:cTn id="147" dur="1000"/>
                                         <p:tgtEl>
-                                          <p:spTgt spid="15"/>
+                                          <p:spTgt spid="18"/>
                                         </p:tgtEl>
                                       </p:cBhvr>
                                     </p:animEffect>
@@ -7698,11 +7415,11 @@
                         <p:par>
                           <p:cTn id="148" fill="hold">
                             <p:stCondLst>
-                              <p:cond delay="41500"/>
+                              <p:cond delay="39500"/>
                             </p:stCondLst>
                             <p:childTnLst>
                               <p:par>
-                                <p:cTn id="149" presetID="10" presetClass="entr" presetSubtype="0" fill="hold" grpId="0" nodeType="afterEffect">
+                                <p:cTn id="149" presetID="10" presetClass="entr" presetSubtype="0" fill="hold" nodeType="afterEffect">
                                   <p:stCondLst>
                                     <p:cond delay="0"/>
                                   </p:stCondLst>
@@ -7715,7 +7432,7 @@
                                           </p:stCondLst>
                                         </p:cTn>
                                         <p:tgtEl>
-                                          <p:spTgt spid="27"/>
+                                          <p:spTgt spid="1069"/>
                                         </p:tgtEl>
                                         <p:attrNameLst>
                                           <p:attrName>style.visibility</p:attrName>
@@ -7729,7 +7446,7 @@
                                       <p:cBhvr>
                                         <p:cTn id="151" dur="1000"/>
                                         <p:tgtEl>
-                                          <p:spTgt spid="27"/>
+                                          <p:spTgt spid="1069"/>
                                         </p:tgtEl>
                                       </p:cBhvr>
                                     </p:animEffect>
@@ -7742,7 +7459,7 @@
                         <p:par>
                           <p:cTn id="152" fill="hold">
                             <p:stCondLst>
-                              <p:cond delay="42500"/>
+                              <p:cond delay="40500"/>
                             </p:stCondLst>
                             <p:childTnLst>
                               <p:par>
@@ -7759,7 +7476,7 @@
                                           </p:stCondLst>
                                         </p:cTn>
                                         <p:tgtEl>
-                                          <p:spTgt spid="1038"/>
+                                          <p:spTgt spid="88"/>
                                         </p:tgtEl>
                                         <p:attrNameLst>
                                           <p:attrName>style.visibility</p:attrName>
@@ -7773,7 +7490,7 @@
                                       <p:cBhvr>
                                         <p:cTn id="155" dur="1000"/>
                                         <p:tgtEl>
-                                          <p:spTgt spid="1038"/>
+                                          <p:spTgt spid="88"/>
                                         </p:tgtEl>
                                       </p:cBhvr>
                                     </p:animEffect>
@@ -7786,7 +7503,7 @@
                         <p:par>
                           <p:cTn id="156" fill="hold">
                             <p:stCondLst>
-                              <p:cond delay="43500"/>
+                              <p:cond delay="41500"/>
                             </p:stCondLst>
                             <p:childTnLst>
                               <p:par>
@@ -7803,7 +7520,7 @@
                                           </p:stCondLst>
                                         </p:cTn>
                                         <p:tgtEl>
-                                          <p:spTgt spid="17"/>
+                                          <p:spTgt spid="31"/>
                                         </p:tgtEl>
                                         <p:attrNameLst>
                                           <p:attrName>style.visibility</p:attrName>
@@ -7817,7 +7534,7 @@
                                       <p:cBhvr>
                                         <p:cTn id="159" dur="1000"/>
                                         <p:tgtEl>
-                                          <p:spTgt spid="17"/>
+                                          <p:spTgt spid="31"/>
                                         </p:tgtEl>
                                       </p:cBhvr>
                                     </p:animEffect>
@@ -7830,11 +7547,11 @@
                         <p:par>
                           <p:cTn id="160" fill="hold">
                             <p:stCondLst>
-                              <p:cond delay="44500"/>
+                              <p:cond delay="42500"/>
                             </p:stCondLst>
                             <p:childTnLst>
                               <p:par>
-                                <p:cTn id="161" presetID="10" presetClass="entr" presetSubtype="0" fill="hold" nodeType="afterEffect">
+                                <p:cTn id="161" presetID="10" presetClass="entr" presetSubtype="0" fill="hold" grpId="0" nodeType="afterEffect">
                                   <p:stCondLst>
                                     <p:cond delay="0"/>
                                   </p:stCondLst>
@@ -7847,7 +7564,7 @@
                                           </p:stCondLst>
                                         </p:cTn>
                                         <p:tgtEl>
-                                          <p:spTgt spid="1048"/>
+                                          <p:spTgt spid="130"/>
                                         </p:tgtEl>
                                         <p:attrNameLst>
                                           <p:attrName>style.visibility</p:attrName>
@@ -7861,7 +7578,7 @@
                                       <p:cBhvr>
                                         <p:cTn id="163" dur="1000"/>
                                         <p:tgtEl>
-                                          <p:spTgt spid="1048"/>
+                                          <p:spTgt spid="130"/>
                                         </p:tgtEl>
                                       </p:cBhvr>
                                     </p:animEffect>
@@ -7874,7 +7591,7 @@
                         <p:par>
                           <p:cTn id="164" fill="hold">
                             <p:stCondLst>
-                              <p:cond delay="45500"/>
+                              <p:cond delay="43500"/>
                             </p:stCondLst>
                             <p:childTnLst>
                               <p:par>
@@ -7891,7 +7608,7 @@
                                           </p:stCondLst>
                                         </p:cTn>
                                         <p:tgtEl>
-                                          <p:spTgt spid="82"/>
+                                          <p:spTgt spid="128"/>
                                         </p:tgtEl>
                                         <p:attrNameLst>
                                           <p:attrName>style.visibility</p:attrName>
@@ -7905,7 +7622,7 @@
                                       <p:cBhvr>
                                         <p:cTn id="167" dur="1000"/>
                                         <p:tgtEl>
-                                          <p:spTgt spid="82"/>
+                                          <p:spTgt spid="128"/>
                                         </p:tgtEl>
                                       </p:cBhvr>
                                     </p:animEffect>
@@ -7918,7 +7635,7 @@
                         <p:par>
                           <p:cTn id="168" fill="hold">
                             <p:stCondLst>
-                              <p:cond delay="46500"/>
+                              <p:cond delay="44500"/>
                             </p:stCondLst>
                             <p:childTnLst>
                               <p:par>
@@ -7935,7 +7652,7 @@
                                           </p:stCondLst>
                                         </p:cTn>
                                         <p:tgtEl>
-                                          <p:spTgt spid="19"/>
+                                          <p:spTgt spid="32"/>
                                         </p:tgtEl>
                                         <p:attrNameLst>
                                           <p:attrName>style.visibility</p:attrName>
@@ -7949,7 +7666,7 @@
                                       <p:cBhvr>
                                         <p:cTn id="171" dur="1000"/>
                                         <p:tgtEl>
-                                          <p:spTgt spid="19"/>
+                                          <p:spTgt spid="32"/>
                                         </p:tgtEl>
                                       </p:cBhvr>
                                     </p:animEffect>
@@ -7962,7 +7679,7 @@
                         <p:par>
                           <p:cTn id="172" fill="hold">
                             <p:stCondLst>
-                              <p:cond delay="47500"/>
+                              <p:cond delay="45500"/>
                             </p:stCondLst>
                             <p:childTnLst>
                               <p:par>
@@ -7979,7 +7696,7 @@
                                           </p:stCondLst>
                                         </p:cTn>
                                         <p:tgtEl>
-                                          <p:spTgt spid="29"/>
+                                          <p:spTgt spid="132"/>
                                         </p:tgtEl>
                                         <p:attrNameLst>
                                           <p:attrName>style.visibility</p:attrName>
@@ -7993,7 +7710,7 @@
                                       <p:cBhvr>
                                         <p:cTn id="175" dur="1000"/>
                                         <p:tgtEl>
-                                          <p:spTgt spid="29"/>
+                                          <p:spTgt spid="132"/>
                                         </p:tgtEl>
                                       </p:cBhvr>
                                     </p:animEffect>
@@ -8006,7 +7723,7 @@
                         <p:par>
                           <p:cTn id="176" fill="hold">
                             <p:stCondLst>
-                              <p:cond delay="48500"/>
+                              <p:cond delay="46500"/>
                             </p:stCondLst>
                             <p:childTnLst>
                               <p:par>
@@ -8023,7 +7740,7 @@
                                           </p:stCondLst>
                                         </p:cTn>
                                         <p:tgtEl>
-                                          <p:spTgt spid="85"/>
+                                          <p:spTgt spid="116"/>
                                         </p:tgtEl>
                                         <p:attrNameLst>
                                           <p:attrName>style.visibility</p:attrName>
@@ -8037,7 +7754,7 @@
                                       <p:cBhvr>
                                         <p:cTn id="179" dur="1000"/>
                                         <p:tgtEl>
-                                          <p:spTgt spid="85"/>
+                                          <p:spTgt spid="116"/>
                                         </p:tgtEl>
                                       </p:cBhvr>
                                     </p:animEffect>
@@ -8050,11 +7767,11 @@
                         <p:par>
                           <p:cTn id="180" fill="hold">
                             <p:stCondLst>
-                              <p:cond delay="49500"/>
+                              <p:cond delay="47500"/>
                             </p:stCondLst>
                             <p:childTnLst>
                               <p:par>
-                                <p:cTn id="181" presetID="10" presetClass="entr" presetSubtype="0" fill="hold" grpId="0" nodeType="afterEffect">
+                                <p:cTn id="181" presetID="10" presetClass="entr" presetSubtype="0" fill="hold" nodeType="afterEffect">
                                   <p:stCondLst>
                                     <p:cond delay="0"/>
                                   </p:stCondLst>
@@ -8067,7 +7784,7 @@
                                           </p:stCondLst>
                                         </p:cTn>
                                         <p:tgtEl>
-                                          <p:spTgt spid="18"/>
+                                          <p:spTgt spid="127"/>
                                         </p:tgtEl>
                                         <p:attrNameLst>
                                           <p:attrName>style.visibility</p:attrName>
@@ -8081,7 +7798,7 @@
                                       <p:cBhvr>
                                         <p:cTn id="183" dur="1000"/>
                                         <p:tgtEl>
-                                          <p:spTgt spid="18"/>
+                                          <p:spTgt spid="127"/>
                                         </p:tgtEl>
                                       </p:cBhvr>
                                     </p:animEffect>
@@ -8094,11 +7811,11 @@
                         <p:par>
                           <p:cTn id="184" fill="hold">
                             <p:stCondLst>
-                              <p:cond delay="50500"/>
+                              <p:cond delay="48500"/>
                             </p:stCondLst>
                             <p:childTnLst>
                               <p:par>
-                                <p:cTn id="185" presetID="10" presetClass="entr" presetSubtype="0" fill="hold" nodeType="afterEffect">
+                                <p:cTn id="185" presetID="10" presetClass="entr" presetSubtype="0" fill="hold" grpId="0" nodeType="afterEffect">
                                   <p:stCondLst>
                                     <p:cond delay="0"/>
                                   </p:stCondLst>
@@ -8111,7 +7828,7 @@
                                           </p:stCondLst>
                                         </p:cTn>
                                         <p:tgtEl>
-                                          <p:spTgt spid="1069"/>
+                                          <p:spTgt spid="59"/>
                                         </p:tgtEl>
                                         <p:attrNameLst>
                                           <p:attrName>style.visibility</p:attrName>
@@ -8125,359 +7842,7 @@
                                       <p:cBhvr>
                                         <p:cTn id="187" dur="1000"/>
                                         <p:tgtEl>
-                                          <p:spTgt spid="1069"/>
-                                        </p:tgtEl>
-                                      </p:cBhvr>
-                                    </p:animEffect>
-                                  </p:childTnLst>
-                                </p:cTn>
-                              </p:par>
-                            </p:childTnLst>
-                          </p:cTn>
-                        </p:par>
-                        <p:par>
-                          <p:cTn id="188" fill="hold">
-                            <p:stCondLst>
-                              <p:cond delay="51500"/>
-                            </p:stCondLst>
-                            <p:childTnLst>
-                              <p:par>
-                                <p:cTn id="189" presetID="10" presetClass="entr" presetSubtype="0" fill="hold" nodeType="afterEffect">
-                                  <p:stCondLst>
-                                    <p:cond delay="0"/>
-                                  </p:stCondLst>
-                                  <p:childTnLst>
-                                    <p:set>
-                                      <p:cBhvr>
-                                        <p:cTn id="190" dur="1" fill="hold">
-                                          <p:stCondLst>
-                                            <p:cond delay="0"/>
-                                          </p:stCondLst>
-                                        </p:cTn>
-                                        <p:tgtEl>
-                                          <p:spTgt spid="88"/>
-                                        </p:tgtEl>
-                                        <p:attrNameLst>
-                                          <p:attrName>style.visibility</p:attrName>
-                                        </p:attrNameLst>
-                                      </p:cBhvr>
-                                      <p:to>
-                                        <p:strVal val="visible"/>
-                                      </p:to>
-                                    </p:set>
-                                    <p:animEffect transition="in" filter="fade">
-                                      <p:cBhvr>
-                                        <p:cTn id="191" dur="1000"/>
-                                        <p:tgtEl>
-                                          <p:spTgt spid="88"/>
-                                        </p:tgtEl>
-                                      </p:cBhvr>
-                                    </p:animEffect>
-                                  </p:childTnLst>
-                                </p:cTn>
-                              </p:par>
-                            </p:childTnLst>
-                          </p:cTn>
-                        </p:par>
-                        <p:par>
-                          <p:cTn id="192" fill="hold">
-                            <p:stCondLst>
-                              <p:cond delay="52500"/>
-                            </p:stCondLst>
-                            <p:childTnLst>
-                              <p:par>
-                                <p:cTn id="193" presetID="10" presetClass="entr" presetSubtype="0" fill="hold" grpId="0" nodeType="afterEffect">
-                                  <p:stCondLst>
-                                    <p:cond delay="0"/>
-                                  </p:stCondLst>
-                                  <p:childTnLst>
-                                    <p:set>
-                                      <p:cBhvr>
-                                        <p:cTn id="194" dur="1" fill="hold">
-                                          <p:stCondLst>
-                                            <p:cond delay="0"/>
-                                          </p:stCondLst>
-                                        </p:cTn>
-                                        <p:tgtEl>
-                                          <p:spTgt spid="31"/>
-                                        </p:tgtEl>
-                                        <p:attrNameLst>
-                                          <p:attrName>style.visibility</p:attrName>
-                                        </p:attrNameLst>
-                                      </p:cBhvr>
-                                      <p:to>
-                                        <p:strVal val="visible"/>
-                                      </p:to>
-                                    </p:set>
-                                    <p:animEffect transition="in" filter="fade">
-                                      <p:cBhvr>
-                                        <p:cTn id="195" dur="1000"/>
-                                        <p:tgtEl>
-                                          <p:spTgt spid="31"/>
-                                        </p:tgtEl>
-                                      </p:cBhvr>
-                                    </p:animEffect>
-                                  </p:childTnLst>
-                                </p:cTn>
-                              </p:par>
-                            </p:childTnLst>
-                          </p:cTn>
-                        </p:par>
-                        <p:par>
-                          <p:cTn id="196" fill="hold">
-                            <p:stCondLst>
-                              <p:cond delay="53500"/>
-                            </p:stCondLst>
-                            <p:childTnLst>
-                              <p:par>
-                                <p:cTn id="197" presetID="10" presetClass="entr" presetSubtype="0" fill="hold" grpId="0" nodeType="afterEffect">
-                                  <p:stCondLst>
-                                    <p:cond delay="0"/>
-                                  </p:stCondLst>
-                                  <p:childTnLst>
-                                    <p:set>
-                                      <p:cBhvr>
-                                        <p:cTn id="198" dur="1" fill="hold">
-                                          <p:stCondLst>
-                                            <p:cond delay="0"/>
-                                          </p:stCondLst>
-                                        </p:cTn>
-                                        <p:tgtEl>
-                                          <p:spTgt spid="130"/>
-                                        </p:tgtEl>
-                                        <p:attrNameLst>
-                                          <p:attrName>style.visibility</p:attrName>
-                                        </p:attrNameLst>
-                                      </p:cBhvr>
-                                      <p:to>
-                                        <p:strVal val="visible"/>
-                                      </p:to>
-                                    </p:set>
-                                    <p:animEffect transition="in" filter="fade">
-                                      <p:cBhvr>
-                                        <p:cTn id="199" dur="1000"/>
-                                        <p:tgtEl>
-                                          <p:spTgt spid="130"/>
-                                        </p:tgtEl>
-                                      </p:cBhvr>
-                                    </p:animEffect>
-                                  </p:childTnLst>
-                                </p:cTn>
-                              </p:par>
-                            </p:childTnLst>
-                          </p:cTn>
-                        </p:par>
-                        <p:par>
-                          <p:cTn id="200" fill="hold">
-                            <p:stCondLst>
-                              <p:cond delay="54500"/>
-                            </p:stCondLst>
-                            <p:childTnLst>
-                              <p:par>
-                                <p:cTn id="201" presetID="10" presetClass="entr" presetSubtype="0" fill="hold" nodeType="afterEffect">
-                                  <p:stCondLst>
-                                    <p:cond delay="0"/>
-                                  </p:stCondLst>
-                                  <p:childTnLst>
-                                    <p:set>
-                                      <p:cBhvr>
-                                        <p:cTn id="202" dur="1" fill="hold">
-                                          <p:stCondLst>
-                                            <p:cond delay="0"/>
-                                          </p:stCondLst>
-                                        </p:cTn>
-                                        <p:tgtEl>
-                                          <p:spTgt spid="128"/>
-                                        </p:tgtEl>
-                                        <p:attrNameLst>
-                                          <p:attrName>style.visibility</p:attrName>
-                                        </p:attrNameLst>
-                                      </p:cBhvr>
-                                      <p:to>
-                                        <p:strVal val="visible"/>
-                                      </p:to>
-                                    </p:set>
-                                    <p:animEffect transition="in" filter="fade">
-                                      <p:cBhvr>
-                                        <p:cTn id="203" dur="1000"/>
-                                        <p:tgtEl>
-                                          <p:spTgt spid="128"/>
-                                        </p:tgtEl>
-                                      </p:cBhvr>
-                                    </p:animEffect>
-                                  </p:childTnLst>
-                                </p:cTn>
-                              </p:par>
-                            </p:childTnLst>
-                          </p:cTn>
-                        </p:par>
-                        <p:par>
-                          <p:cTn id="204" fill="hold">
-                            <p:stCondLst>
-                              <p:cond delay="55500"/>
-                            </p:stCondLst>
-                            <p:childTnLst>
-                              <p:par>
-                                <p:cTn id="205" presetID="10" presetClass="entr" presetSubtype="0" fill="hold" grpId="0" nodeType="afterEffect">
-                                  <p:stCondLst>
-                                    <p:cond delay="0"/>
-                                  </p:stCondLst>
-                                  <p:childTnLst>
-                                    <p:set>
-                                      <p:cBhvr>
-                                        <p:cTn id="206" dur="1" fill="hold">
-                                          <p:stCondLst>
-                                            <p:cond delay="0"/>
-                                          </p:stCondLst>
-                                        </p:cTn>
-                                        <p:tgtEl>
-                                          <p:spTgt spid="32"/>
-                                        </p:tgtEl>
-                                        <p:attrNameLst>
-                                          <p:attrName>style.visibility</p:attrName>
-                                        </p:attrNameLst>
-                                      </p:cBhvr>
-                                      <p:to>
-                                        <p:strVal val="visible"/>
-                                      </p:to>
-                                    </p:set>
-                                    <p:animEffect transition="in" filter="fade">
-                                      <p:cBhvr>
-                                        <p:cTn id="207" dur="1000"/>
-                                        <p:tgtEl>
-                                          <p:spTgt spid="32"/>
-                                        </p:tgtEl>
-                                      </p:cBhvr>
-                                    </p:animEffect>
-                                  </p:childTnLst>
-                                </p:cTn>
-                              </p:par>
-                            </p:childTnLst>
-                          </p:cTn>
-                        </p:par>
-                        <p:par>
-                          <p:cTn id="208" fill="hold">
-                            <p:stCondLst>
-                              <p:cond delay="56500"/>
-                            </p:stCondLst>
-                            <p:childTnLst>
-                              <p:par>
-                                <p:cTn id="209" presetID="10" presetClass="entr" presetSubtype="0" fill="hold" grpId="0" nodeType="afterEffect">
-                                  <p:stCondLst>
-                                    <p:cond delay="0"/>
-                                  </p:stCondLst>
-                                  <p:childTnLst>
-                                    <p:set>
-                                      <p:cBhvr>
-                                        <p:cTn id="210" dur="1" fill="hold">
-                                          <p:stCondLst>
-                                            <p:cond delay="0"/>
-                                          </p:stCondLst>
-                                        </p:cTn>
-                                        <p:tgtEl>
-                                          <p:spTgt spid="132"/>
-                                        </p:tgtEl>
-                                        <p:attrNameLst>
-                                          <p:attrName>style.visibility</p:attrName>
-                                        </p:attrNameLst>
-                                      </p:cBhvr>
-                                      <p:to>
-                                        <p:strVal val="visible"/>
-                                      </p:to>
-                                    </p:set>
-                                    <p:animEffect transition="in" filter="fade">
-                                      <p:cBhvr>
-                                        <p:cTn id="211" dur="1000"/>
-                                        <p:tgtEl>
-                                          <p:spTgt spid="132"/>
-                                        </p:tgtEl>
-                                      </p:cBhvr>
-                                    </p:animEffect>
-                                  </p:childTnLst>
-                                </p:cTn>
-                              </p:par>
-                            </p:childTnLst>
-                          </p:cTn>
-                        </p:par>
-                        <p:par>
-                          <p:cTn id="212" fill="hold">
-                            <p:stCondLst>
-                              <p:cond delay="57500"/>
-                            </p:stCondLst>
-                            <p:childTnLst>
-                              <p:par>
-                                <p:cTn id="213" presetID="10" presetClass="entr" presetSubtype="0" fill="hold" nodeType="afterEffect">
-                                  <p:stCondLst>
-                                    <p:cond delay="0"/>
-                                  </p:stCondLst>
-                                  <p:childTnLst>
-                                    <p:set>
-                                      <p:cBhvr>
-                                        <p:cTn id="214" dur="1" fill="hold">
-                                          <p:stCondLst>
-                                            <p:cond delay="0"/>
-                                          </p:stCondLst>
-                                        </p:cTn>
-                                        <p:tgtEl>
-                                          <p:spTgt spid="116"/>
-                                        </p:tgtEl>
-                                        <p:attrNameLst>
-                                          <p:attrName>style.visibility</p:attrName>
-                                        </p:attrNameLst>
-                                      </p:cBhvr>
-                                      <p:to>
-                                        <p:strVal val="visible"/>
-                                      </p:to>
-                                    </p:set>
-                                    <p:animEffect transition="in" filter="fade">
-                                      <p:cBhvr>
-                                        <p:cTn id="215" dur="1000"/>
-                                        <p:tgtEl>
-                                          <p:spTgt spid="116"/>
-                                        </p:tgtEl>
-                                      </p:cBhvr>
-                                    </p:animEffect>
-                                  </p:childTnLst>
-                                </p:cTn>
-                              </p:par>
-                            </p:childTnLst>
-                          </p:cTn>
-                        </p:par>
-                        <p:par>
-                          <p:cTn id="216" fill="hold">
-                            <p:stCondLst>
-                              <p:cond delay="58500"/>
-                            </p:stCondLst>
-                            <p:childTnLst>
-                              <p:par>
-                                <p:cTn id="217" presetID="10" presetClass="entr" presetSubtype="0" fill="hold" nodeType="afterEffect">
-                                  <p:stCondLst>
-                                    <p:cond delay="0"/>
-                                  </p:stCondLst>
-                                  <p:childTnLst>
-                                    <p:set>
-                                      <p:cBhvr>
-                                        <p:cTn id="218" dur="1" fill="hold">
-                                          <p:stCondLst>
-                                            <p:cond delay="0"/>
-                                          </p:stCondLst>
-                                        </p:cTn>
-                                        <p:tgtEl>
-                                          <p:spTgt spid="127"/>
-                                        </p:tgtEl>
-                                        <p:attrNameLst>
-                                          <p:attrName>style.visibility</p:attrName>
-                                        </p:attrNameLst>
-                                      </p:cBhvr>
-                                      <p:to>
-                                        <p:strVal val="visible"/>
-                                      </p:to>
-                                    </p:set>
-                                    <p:animEffect transition="in" filter="fade">
-                                      <p:cBhvr>
-                                        <p:cTn id="219" dur="1000"/>
-                                        <p:tgtEl>
-                                          <p:spTgt spid="127"/>
+                                          <p:spTgt spid="59"/>
                                         </p:tgtEl>
                                       </p:cBhvr>
                                     </p:animEffect>
@@ -8517,7 +7882,6 @@
       <p:bldP spid="4" grpId="0" animBg="1"/>
       <p:bldP spid="6" grpId="0" animBg="1"/>
       <p:bldP spid="7" grpId="0" animBg="1"/>
-      <p:bldP spid="8" grpId="0" animBg="1"/>
       <p:bldP spid="9" grpId="0" animBg="1"/>
       <p:bldP spid="10" grpId="0" animBg="1"/>
       <p:bldP spid="11" grpId="0" animBg="1"/>
@@ -8527,22 +7891,18 @@
       <p:bldP spid="17" grpId="0" animBg="1"/>
       <p:bldP spid="18" grpId="0" animBg="1"/>
       <p:bldP spid="19" grpId="0" animBg="1"/>
-      <p:bldP spid="20" grpId="0" animBg="1"/>
-      <p:bldP spid="21" grpId="0" animBg="1"/>
       <p:bldP spid="23" grpId="0" animBg="1"/>
       <p:bldP spid="26" grpId="0" animBg="1"/>
       <p:bldP spid="27" grpId="0" animBg="1"/>
       <p:bldP spid="29" grpId="0" animBg="1"/>
       <p:bldP spid="31" grpId="0" animBg="1"/>
       <p:bldP spid="32" grpId="0" animBg="1"/>
-      <p:bldP spid="46" grpId="0"/>
       <p:bldP spid="53" grpId="0"/>
-      <p:bldP spid="54" grpId="0"/>
       <p:bldP spid="55" grpId="0"/>
       <p:bldP spid="1073" grpId="0" animBg="1"/>
       <p:bldP spid="130" grpId="0"/>
       <p:bldP spid="132" grpId="0" animBg="1"/>
-      <p:bldP spid="165" grpId="0" animBg="1"/>
+      <p:bldP spid="59" grpId="0" animBg="1"/>
     </p:bldLst>
   </p:timing>
 </p:sld>

</xml_diff>